<commit_message>
Edited slide deck v2
</commit_message>
<xml_diff>
--- a/Data Bootcamp Project.pptx
+++ b/Data Bootcamp Project.pptx
@@ -21,7 +21,8 @@
     <p:sldId id="272" r:id="rId15"/>
     <p:sldId id="269" r:id="rId16"/>
     <p:sldId id="263" r:id="rId17"/>
-    <p:sldId id="260" r:id="rId18"/>
+    <p:sldId id="273" r:id="rId18"/>
+    <p:sldId id="260" r:id="rId19"/>
   </p:sldIdLst>
   <p:sldSz cx="12192000" cy="6858000"/>
   <p:notesSz cx="6858000" cy="9144000"/>
@@ -4089,11 +4090,8 @@
             <a:br>
               <a:rPr lang="en-US" sz="8000" dirty="0"/>
             </a:br>
-            <a:br>
-              <a:rPr lang="en-US" sz="8000" dirty="0"/>
-            </a:br>
-            <a:r>
-              <a:rPr lang="en-US" sz="8000" dirty="0"/>
+            <a:r>
+              <a:rPr lang="en-US" sz="8000" u="sng" dirty="0"/>
               <a:t>Fantasy Football</a:t>
             </a:r>
           </a:p>
@@ -5078,6 +5076,9 @@
             </a:lvl9pPr>
           </a:lstStyle>
           <a:p>
+            <a:endParaRPr lang="en-US" sz="2400" dirty="0"/>
+          </a:p>
+          <a:p>
             <a:r>
               <a:rPr lang="en-US" sz="2400" dirty="0"/>
               <a:t>Slope = .0038366969</a:t>
@@ -5134,6 +5135,129 @@
           <p:cNvPr id="2" name="Title 1">
             <a:extLst>
               <a:ext uri="{FF2B5EF4-FFF2-40B4-BE49-F238E27FC236}">
+                <a16:creationId xmlns:a16="http://schemas.microsoft.com/office/drawing/2014/main" id="{D8E4CCBF-459F-439C-8288-C7D53E1A29D5}"/>
+              </a:ext>
+            </a:extLst>
+          </p:cNvPr>
+          <p:cNvSpPr>
+            <a:spLocks noGrp="1"/>
+          </p:cNvSpPr>
+          <p:nvPr>
+            <p:ph type="title"/>
+          </p:nvPr>
+        </p:nvSpPr>
+        <p:spPr/>
+        <p:txBody>
+          <a:bodyPr/>
+          <a:lstStyle/>
+          <a:p>
+            <a:r>
+              <a:rPr lang="en-US" dirty="0"/>
+              <a:t>Additional Analysis</a:t>
+            </a:r>
+          </a:p>
+        </p:txBody>
+      </p:sp>
+      <p:sp>
+        <p:nvSpPr>
+          <p:cNvPr id="3" name="Content Placeholder 2">
+            <a:extLst>
+              <a:ext uri="{FF2B5EF4-FFF2-40B4-BE49-F238E27FC236}">
+                <a16:creationId xmlns:a16="http://schemas.microsoft.com/office/drawing/2014/main" id="{E55AC9FA-3662-426C-B028-500B11A2CD41}"/>
+              </a:ext>
+            </a:extLst>
+          </p:cNvPr>
+          <p:cNvSpPr>
+            <a:spLocks noGrp="1"/>
+          </p:cNvSpPr>
+          <p:nvPr>
+            <p:ph idx="1"/>
+          </p:nvPr>
+        </p:nvSpPr>
+        <p:spPr/>
+        <p:txBody>
+          <a:bodyPr/>
+          <a:lstStyle/>
+          <a:p>
+            <a:r>
+              <a:rPr lang="en-US" sz="2400" dirty="0"/>
+              <a:t>With more time and data we could approach a few different questions, such as:</a:t>
+            </a:r>
+          </a:p>
+          <a:p>
+            <a:pPr lvl="1"/>
+            <a:endParaRPr lang="en-US" sz="2000" dirty="0"/>
+          </a:p>
+          <a:p>
+            <a:pPr lvl="1"/>
+            <a:r>
+              <a:rPr lang="en-US" sz="2000" dirty="0"/>
+              <a:t>Which positions are the most valuable? (this depends on scarcity, fantasy football rules and many other factors)</a:t>
+            </a:r>
+          </a:p>
+          <a:p>
+            <a:pPr lvl="1"/>
+            <a:endParaRPr lang="en-US" sz="2000" dirty="0"/>
+          </a:p>
+          <a:p>
+            <a:pPr lvl="1"/>
+            <a:r>
+              <a:rPr lang="en-US" sz="2000" dirty="0"/>
+              <a:t>Apply a weighting to positions to help balance the analysis and get a better analysis on what colleges produce the best fantasy football players.</a:t>
+            </a:r>
+          </a:p>
+          <a:p>
+            <a:pPr lvl="1"/>
+            <a:endParaRPr lang="en-US" sz="2000" dirty="0"/>
+          </a:p>
+          <a:p>
+            <a:pPr lvl="1"/>
+            <a:r>
+              <a:rPr lang="en-US" sz="2000" dirty="0"/>
+              <a:t>Study measurable information (height, weight, 40 meter dash, shuttle time, etc.) and combine that info with opportunity to predict the best fantasy output.</a:t>
+            </a:r>
+          </a:p>
+          <a:p>
+            <a:pPr lvl="1"/>
+            <a:endParaRPr lang="en-US" dirty="0"/>
+          </a:p>
+        </p:txBody>
+      </p:sp>
+    </p:spTree>
+    <p:extLst>
+      <p:ext uri="{BB962C8B-B14F-4D97-AF65-F5344CB8AC3E}">
+        <p14:creationId xmlns:p14="http://schemas.microsoft.com/office/powerpoint/2010/main" val="1425789481"/>
+      </p:ext>
+    </p:extLst>
+  </p:cSld>
+  <p:clrMapOvr>
+    <a:masterClrMapping/>
+  </p:clrMapOvr>
+</p:sld>
+</file>
+
+<file path=ppt/slides/slide18.xml><?xml version="1.0" encoding="utf-8"?>
+<p:sld xmlns:a="http://schemas.openxmlformats.org/drawingml/2006/main" xmlns:r="http://schemas.openxmlformats.org/officeDocument/2006/relationships" xmlns:p="http://schemas.openxmlformats.org/presentationml/2006/main">
+  <p:cSld>
+    <p:spTree>
+      <p:nvGrpSpPr>
+        <p:cNvPr id="1" name=""/>
+        <p:cNvGrpSpPr/>
+        <p:nvPr/>
+      </p:nvGrpSpPr>
+      <p:grpSpPr>
+        <a:xfrm>
+          <a:off x="0" y="0"/>
+          <a:ext cx="0" cy="0"/>
+          <a:chOff x="0" y="0"/>
+          <a:chExt cx="0" cy="0"/>
+        </a:xfrm>
+      </p:grpSpPr>
+      <p:sp>
+        <p:nvSpPr>
+          <p:cNvPr id="2" name="Title 1">
+            <a:extLst>
+              <a:ext uri="{FF2B5EF4-FFF2-40B4-BE49-F238E27FC236}">
                 <a16:creationId xmlns:a16="http://schemas.microsoft.com/office/drawing/2014/main" id="{8FE5E3DB-6827-44A3-8760-41FDA9A4CE6F}"/>
               </a:ext>
             </a:extLst>
@@ -5414,29 +5538,27 @@
             </a:r>
           </a:p>
           <a:p>
-            <a:endParaRPr lang="en-US" sz="2400" dirty="0"/>
-          </a:p>
-          <a:p>
             <a:pPr marL="0" indent="0">
               <a:buNone/>
             </a:pPr>
             <a:endParaRPr lang="en-US" dirty="0"/>
           </a:p>
           <a:p>
-            <a:r>
-              <a:rPr lang="en-US" sz="2400" dirty="0"/>
+            <a:pPr lvl="1"/>
+            <a:r>
+              <a:rPr lang="en-US" sz="2200" dirty="0"/>
               <a:t>Motivations:</a:t>
             </a:r>
           </a:p>
           <a:p>
-            <a:pPr lvl="1"/>
+            <a:pPr lvl="2"/>
             <a:r>
               <a:rPr lang="en-US" dirty="0"/>
               <a:t>Interest in football.</a:t>
             </a:r>
           </a:p>
           <a:p>
-            <a:pPr lvl="1"/>
+            <a:pPr lvl="2"/>
             <a:r>
               <a:rPr lang="en-US" dirty="0"/>
               <a:t>Wondering if there were any strong relations between colleges/conferences and fantasy production.</a:t>
@@ -5539,10 +5661,18 @@
           </a:p>
           <a:p>
             <a:pPr lvl="1"/>
+            <a:endParaRPr lang="en-US" sz="2400" dirty="0"/>
+          </a:p>
+          <a:p>
+            <a:pPr lvl="1"/>
             <a:r>
               <a:rPr lang="en-US" sz="2400" dirty="0"/>
               <a:t>What positions have the highest fantasy output since 2000?</a:t>
             </a:r>
+          </a:p>
+          <a:p>
+            <a:pPr lvl="1"/>
+            <a:endParaRPr lang="en-US" sz="2400" dirty="0"/>
           </a:p>
           <a:p>
             <a:pPr lvl="1"/>
@@ -5769,7 +5899,7 @@
           <a:p>
             <a:r>
               <a:rPr lang="en-US" sz="2400" dirty="0"/>
-              <a:t>Scripts we used aggregation and cleanup:</a:t>
+              <a:t>Steps:</a:t>
             </a:r>
           </a:p>
           <a:p>
@@ -5777,6 +5907,89 @@
               <a:buFont typeface="+mj-lt"/>
               <a:buAutoNum type="arabicPeriod"/>
             </a:pPr>
+            <a:r>
+              <a:rPr lang="en-US" dirty="0"/>
+              <a:t>We started by seeing what the JSON data looked like, and grabbed a unique identifier for each NFL team. We exported this list into 'teams_df.csv’.</a:t>
+            </a:r>
+          </a:p>
+          <a:p>
+            <a:pPr marL="914400" lvl="1" indent="-457200">
+              <a:buFont typeface="+mj-lt"/>
+              <a:buAutoNum type="arabicPeriod"/>
+            </a:pPr>
+            <a:r>
+              <a:rPr lang="en-US" dirty="0"/>
+              <a:t>We then looped through each team in </a:t>
+            </a:r>
+            <a:r>
+              <a:rPr lang="en-US" dirty="0" err="1"/>
+              <a:t>teams_df</a:t>
+            </a:r>
+            <a:r>
+              <a:rPr lang="en-US" dirty="0"/>
+              <a:t>, and retrieved seasonal stats for that team from each year the service had data from 2000-2017.(1</a:t>
+            </a:r>
+            <a:r>
+              <a:rPr lang="en-US" baseline="30000" dirty="0"/>
+              <a:t>st</a:t>
+            </a:r>
+            <a:r>
+              <a:rPr lang="en-US" dirty="0"/>
+              <a:t> major issue)</a:t>
+            </a:r>
+          </a:p>
+          <a:p>
+            <a:pPr marL="914400" lvl="1" indent="-457200">
+              <a:buFont typeface="+mj-lt"/>
+              <a:buAutoNum type="arabicPeriod"/>
+            </a:pPr>
+            <a:r>
+              <a:rPr lang="en-US" dirty="0"/>
+              <a:t>We had to filter the list of 35,000+ rows that contained multiple years of data for each player, and extract a list of unique player IDs. The total unique IDs were ~ 9,000, so we limited the list to offensive players only since they generate the most fantasy points. </a:t>
+            </a:r>
+          </a:p>
+          <a:p>
+            <a:pPr marL="914400" lvl="1" indent="-457200">
+              <a:buFont typeface="+mj-lt"/>
+              <a:buAutoNum type="arabicPeriod"/>
+            </a:pPr>
+            <a:r>
+              <a:rPr lang="en-US" dirty="0"/>
+              <a:t>The next step in our data collection process was to calculate the amount of fantasy points generated by each player.</a:t>
+            </a:r>
+          </a:p>
+          <a:p>
+            <a:pPr marL="914400" lvl="1" indent="-457200">
+              <a:buFont typeface="+mj-lt"/>
+              <a:buAutoNum type="arabicPeriod"/>
+            </a:pPr>
+            <a:r>
+              <a:rPr lang="en-US" dirty="0"/>
+              <a:t>To make our job in analyzing the data a bit easier, we also went through each line in a loop, and added a new column that totaled all the points for each player for that year.</a:t>
+            </a:r>
+          </a:p>
+          <a:p>
+            <a:pPr lvl="1" indent="0">
+              <a:buNone/>
+            </a:pPr>
+            <a:r>
+              <a:rPr lang="en-US" dirty="0"/>
+              <a:t>Link to </a:t>
+            </a:r>
+            <a:r>
+              <a:rPr lang="en-US" dirty="0" err="1"/>
+              <a:t>jupyter</a:t>
+            </a:r>
+            <a:r>
+              <a:rPr lang="en-US" dirty="0"/>
+              <a:t> notebook: </a:t>
+            </a:r>
+            <a:r>
+              <a:rPr lang="en-US" dirty="0">
+                <a:hlinkClick r:id="rId2"/>
+              </a:rPr>
+              <a:t>Football</a:t>
+            </a:r>
             <a:endParaRPr lang="en-US" dirty="0"/>
           </a:p>
         </p:txBody>
@@ -5862,7 +6075,25 @@
           <a:p>
             <a:r>
               <a:rPr lang="en-US" sz="2400" dirty="0"/>
-              <a:t>Our data analysis for our main question we aimed to show which colleges had the most productive fantasy football players in the NFL over the last 17 seasons.</a:t>
+              <a:t>In our data analysis for our main question we aimed to show which colleges and which positions had the most productive fantasy football players in the NFL over the last 18 seasons.</a:t>
+            </a:r>
+          </a:p>
+          <a:p>
+            <a:endParaRPr lang="en-US" sz="2400" dirty="0"/>
+          </a:p>
+          <a:p>
+            <a:r>
+              <a:rPr lang="en-US" sz="2400" dirty="0"/>
+              <a:t>We did this by comparing fantasy point production against different cross sections of players based on their college, college conference, and position.</a:t>
+            </a:r>
+          </a:p>
+          <a:p>
+            <a:endParaRPr lang="en-US" sz="2400" dirty="0"/>
+          </a:p>
+          <a:p>
+            <a:r>
+              <a:rPr lang="en-US" sz="2400" dirty="0"/>
+              <a:t>As additional analysis, we did a regression of the scatter plot where we showed the count from a college vs. fantasy point production. </a:t>
             </a:r>
           </a:p>
         </p:txBody>

</xml_diff>

<commit_message>
Final PP and updated PNGs
</commit_message>
<xml_diff>
--- a/Data Bootcamp Project.pptx
+++ b/Data Bootcamp Project.pptx
@@ -4771,41 +4771,6 @@
           </a:p>
         </p:txBody>
       </p:sp>
-      <p:pic>
-        <p:nvPicPr>
-          <p:cNvPr id="5" name="Content Placeholder 4">
-            <a:extLst>
-              <a:ext uri="{FF2B5EF4-FFF2-40B4-BE49-F238E27FC236}">
-                <a16:creationId xmlns:a16="http://schemas.microsoft.com/office/drawing/2014/main" id="{7496E525-CC2C-4EE3-A90E-A31B278C64F4}"/>
-              </a:ext>
-            </a:extLst>
-          </p:cNvPr>
-          <p:cNvPicPr>
-            <a:picLocks noGrp="1" noChangeAspect="1"/>
-          </p:cNvPicPr>
-          <p:nvPr>
-            <p:ph idx="1"/>
-          </p:nvPr>
-        </p:nvPicPr>
-        <p:blipFill>
-          <a:blip r:embed="rId2">
-            <a:extLst>
-              <a:ext uri="{28A0092B-C50C-407E-A947-70E740481C1C}">
-                <a14:useLocalDpi xmlns:a14="http://schemas.microsoft.com/office/drawing/2010/main" val="0"/>
-              </a:ext>
-            </a:extLst>
-          </a:blip>
-          <a:stretch>
-            <a:fillRect/>
-          </a:stretch>
-        </p:blipFill>
-        <p:spPr>
-          <a:xfrm>
-            <a:off x="4667250" y="125730"/>
-            <a:ext cx="6454902" cy="6454902"/>
-          </a:xfrm>
-        </p:spPr>
-      </p:pic>
       <p:sp>
         <p:nvSpPr>
           <p:cNvPr id="7" name="Content Placeholder 2">
@@ -5100,6 +5065,41 @@
           </a:p>
         </p:txBody>
       </p:sp>
+      <p:pic>
+        <p:nvPicPr>
+          <p:cNvPr id="8" name="Content Placeholder 7">
+            <a:extLst>
+              <a:ext uri="{FF2B5EF4-FFF2-40B4-BE49-F238E27FC236}">
+                <a16:creationId xmlns:a16="http://schemas.microsoft.com/office/drawing/2014/main" id="{986609FE-ED73-4621-9B61-2AA42BAB70B7}"/>
+              </a:ext>
+            </a:extLst>
+          </p:cNvPr>
+          <p:cNvPicPr>
+            <a:picLocks noGrp="1" noChangeAspect="1"/>
+          </p:cNvPicPr>
+          <p:nvPr>
+            <p:ph idx="1"/>
+          </p:nvPr>
+        </p:nvPicPr>
+        <p:blipFill>
+          <a:blip r:embed="rId2">
+            <a:extLst>
+              <a:ext uri="{28A0092B-C50C-407E-A947-70E740481C1C}">
+                <a14:useLocalDpi xmlns:a14="http://schemas.microsoft.com/office/drawing/2010/main" val="0"/>
+              </a:ext>
+            </a:extLst>
+          </a:blip>
+          <a:stretch>
+            <a:fillRect/>
+          </a:stretch>
+        </p:blipFill>
+        <p:spPr>
+          <a:xfrm>
+            <a:off x="4733544" y="234696"/>
+            <a:ext cx="6388608" cy="6388608"/>
+          </a:xfrm>
+        </p:spPr>
+      </p:pic>
     </p:spTree>
     <p:extLst>
       <p:ext uri="{BB962C8B-B14F-4D97-AF65-F5344CB8AC3E}">
@@ -5927,7 +5927,7 @@
             </a:r>
             <a:r>
               <a:rPr lang="en-US" dirty="0"/>
-              <a:t>, and retrieved seasonal stats for that team from each year the service had data from 2000-2017.(1</a:t>
+              <a:t>, and retrieved seasonal stats for that team from each year the service had data from 2000-2016.(1</a:t>
             </a:r>
             <a:r>
               <a:rPr lang="en-US" baseline="30000" dirty="0"/>
@@ -6077,7 +6077,7 @@
           <a:p>
             <a:r>
               <a:rPr lang="en-US" sz="2600" dirty="0"/>
-              <a:t>In our data analysis for our main question we aimed to show which colleges and which positions had the most productive fantasy football players in the NFL over the last 18 seasons.</a:t>
+              <a:t>In our data analysis for our main question we aimed to show which colleges and which positions had the most productive fantasy football players in the NFL over the last 17 seasons.</a:t>
             </a:r>
           </a:p>
           <a:p>
@@ -6198,41 +6198,6 @@
           </a:p>
         </p:txBody>
       </p:sp>
-      <p:pic>
-        <p:nvPicPr>
-          <p:cNvPr id="5" name="Content Placeholder 4">
-            <a:extLst>
-              <a:ext uri="{FF2B5EF4-FFF2-40B4-BE49-F238E27FC236}">
-                <a16:creationId xmlns:a16="http://schemas.microsoft.com/office/drawing/2014/main" id="{6CDBFE9E-5BD2-4535-9E24-A57966CC72FD}"/>
-              </a:ext>
-            </a:extLst>
-          </p:cNvPr>
-          <p:cNvPicPr>
-            <a:picLocks noGrp="1" noChangeAspect="1"/>
-          </p:cNvPicPr>
-          <p:nvPr>
-            <p:ph idx="1"/>
-          </p:nvPr>
-        </p:nvPicPr>
-        <p:blipFill>
-          <a:blip r:embed="rId2">
-            <a:extLst>
-              <a:ext uri="{28A0092B-C50C-407E-A947-70E740481C1C}">
-                <a14:useLocalDpi xmlns:a14="http://schemas.microsoft.com/office/drawing/2010/main" val="0"/>
-              </a:ext>
-            </a:extLst>
-          </a:blip>
-          <a:stretch>
-            <a:fillRect/>
-          </a:stretch>
-        </p:blipFill>
-        <p:spPr>
-          <a:xfrm>
-            <a:off x="4733925" y="248793"/>
-            <a:ext cx="6388227" cy="6388227"/>
-          </a:xfrm>
-        </p:spPr>
-      </p:pic>
       <p:graphicFrame>
         <p:nvGraphicFramePr>
           <p:cNvPr id="11" name="Table 10">
@@ -8152,6 +8117,41 @@
           </a:graphicData>
         </a:graphic>
       </p:graphicFrame>
+      <p:pic>
+        <p:nvPicPr>
+          <p:cNvPr id="6" name="Content Placeholder 5">
+            <a:extLst>
+              <a:ext uri="{FF2B5EF4-FFF2-40B4-BE49-F238E27FC236}">
+                <a16:creationId xmlns:a16="http://schemas.microsoft.com/office/drawing/2014/main" id="{7FC2A14B-C6FE-4504-9823-C8C8FA0EB5F0}"/>
+              </a:ext>
+            </a:extLst>
+          </p:cNvPr>
+          <p:cNvPicPr>
+            <a:picLocks noGrp="1" noChangeAspect="1"/>
+          </p:cNvPicPr>
+          <p:nvPr>
+            <p:ph idx="1"/>
+          </p:nvPr>
+        </p:nvPicPr>
+        <p:blipFill>
+          <a:blip r:embed="rId2">
+            <a:extLst>
+              <a:ext uri="{28A0092B-C50C-407E-A947-70E740481C1C}">
+                <a14:useLocalDpi xmlns:a14="http://schemas.microsoft.com/office/drawing/2010/main" val="0"/>
+              </a:ext>
+            </a:extLst>
+          </a:blip>
+          <a:stretch>
+            <a:fillRect/>
+          </a:stretch>
+        </p:blipFill>
+        <p:spPr>
+          <a:xfrm>
+            <a:off x="4787899" y="169378"/>
+            <a:ext cx="6519243" cy="6519243"/>
+          </a:xfrm>
+        </p:spPr>
+      </p:pic>
     </p:spTree>
     <p:extLst>
       <p:ext uri="{BB962C8B-B14F-4D97-AF65-F5344CB8AC3E}">

</xml_diff>